<commit_message>
Update chapter 5 material
</commit_message>
<xml_diff>
--- a/5.Python_반복문/5.Python_반복문.pptx
+++ b/5.Python_반복문/5.Python_반복문.pptx
@@ -31,8 +31,8 @@
     <p:sldId id="415" r:id="rId25"/>
     <p:sldId id="420" r:id="rId26"/>
     <p:sldId id="421" r:id="rId27"/>
-    <p:sldId id="418" r:id="rId28"/>
-    <p:sldId id="419" r:id="rId29"/>
+    <p:sldId id="419" r:id="rId28"/>
+    <p:sldId id="418" r:id="rId29"/>
     <p:sldId id="422" r:id="rId30"/>
     <p:sldId id="423" r:id="rId31"/>
     <p:sldId id="425" r:id="rId32"/>
@@ -225,7 +225,7 @@
           <a:p>
             <a:fld id="{860E4C0E-3822-4470-875C-25F6E634D1E2}" type="datetimeFigureOut">
               <a:rPr lang="ko-KR" altLang="en-US" smtClean="0"/>
-              <a:t>2021-05-27</a:t>
+              <a:t>2021-07-03</a:t>
             </a:fld>
             <a:endParaRPr lang="ko-KR" altLang="en-US"/>
           </a:p>
@@ -643,7 +643,7 @@
           <a:p>
             <a:fld id="{3D067A03-45D1-4EAE-8DA0-F79B7BEE625A}" type="datetimeFigureOut">
               <a:rPr lang="ko-KR" altLang="en-US" smtClean="0"/>
-              <a:t>2021-05-27</a:t>
+              <a:t>2021-07-03</a:t>
             </a:fld>
             <a:endParaRPr lang="ko-KR" altLang="en-US"/>
           </a:p>
@@ -1367,7 +1367,7 @@
           <a:p>
             <a:fld id="{3D067A03-45D1-4EAE-8DA0-F79B7BEE625A}" type="datetimeFigureOut">
               <a:rPr lang="ko-KR" altLang="en-US" smtClean="0"/>
-              <a:t>2021-05-27</a:t>
+              <a:t>2021-07-03</a:t>
             </a:fld>
             <a:endParaRPr lang="ko-KR" altLang="en-US"/>
           </a:p>
@@ -1958,7 +1958,7 @@
           <a:p>
             <a:fld id="{3D067A03-45D1-4EAE-8DA0-F79B7BEE625A}" type="datetimeFigureOut">
               <a:rPr lang="ko-KR" altLang="en-US" smtClean="0"/>
-              <a:t>2021-05-27</a:t>
+              <a:t>2021-07-03</a:t>
             </a:fld>
             <a:endParaRPr lang="ko-KR" altLang="en-US"/>
           </a:p>
@@ -2474,7 +2474,7 @@
           <a:p>
             <a:fld id="{3D067A03-45D1-4EAE-8DA0-F79B7BEE625A}" type="datetimeFigureOut">
               <a:rPr lang="ko-KR" altLang="en-US" smtClean="0"/>
-              <a:t>2021-05-27</a:t>
+              <a:t>2021-07-03</a:t>
             </a:fld>
             <a:endParaRPr lang="ko-KR" altLang="en-US"/>
           </a:p>
@@ -3055,7 +3055,7 @@
           <a:p>
             <a:fld id="{3D067A03-45D1-4EAE-8DA0-F79B7BEE625A}" type="datetimeFigureOut">
               <a:rPr lang="ko-KR" altLang="en-US" smtClean="0"/>
-              <a:t>2021-05-27</a:t>
+              <a:t>2021-07-03</a:t>
             </a:fld>
             <a:endParaRPr lang="ko-KR" altLang="en-US"/>
           </a:p>
@@ -3709,7 +3709,7 @@
           <a:p>
             <a:fld id="{3D067A03-45D1-4EAE-8DA0-F79B7BEE625A}" type="datetimeFigureOut">
               <a:rPr lang="ko-KR" altLang="en-US" smtClean="0"/>
-              <a:t>2021-05-27</a:t>
+              <a:t>2021-07-03</a:t>
             </a:fld>
             <a:endParaRPr lang="ko-KR" altLang="en-US"/>
           </a:p>
@@ -4357,7 +4357,7 @@
           <a:p>
             <a:fld id="{3D067A03-45D1-4EAE-8DA0-F79B7BEE625A}" type="datetimeFigureOut">
               <a:rPr lang="ko-KR" altLang="en-US" smtClean="0"/>
-              <a:t>2021-05-27</a:t>
+              <a:t>2021-07-03</a:t>
             </a:fld>
             <a:endParaRPr lang="ko-KR" altLang="en-US"/>
           </a:p>
@@ -5152,7 +5152,7 @@
           <a:p>
             <a:fld id="{3D067A03-45D1-4EAE-8DA0-F79B7BEE625A}" type="datetimeFigureOut">
               <a:rPr lang="ko-KR" altLang="en-US" smtClean="0"/>
-              <a:t>2021-05-27</a:t>
+              <a:t>2021-07-03</a:t>
             </a:fld>
             <a:endParaRPr lang="ko-KR" altLang="en-US"/>
           </a:p>
@@ -5676,7 +5676,7 @@
           <a:p>
             <a:fld id="{3D067A03-45D1-4EAE-8DA0-F79B7BEE625A}" type="datetimeFigureOut">
               <a:rPr lang="ko-KR" altLang="en-US" smtClean="0"/>
-              <a:t>2021-05-27</a:t>
+              <a:t>2021-07-03</a:t>
             </a:fld>
             <a:endParaRPr lang="ko-KR" altLang="en-US"/>
           </a:p>
@@ -6164,7 +6164,7 @@
           <a:p>
             <a:fld id="{3D067A03-45D1-4EAE-8DA0-F79B7BEE625A}" type="datetimeFigureOut">
               <a:rPr lang="ko-KR" altLang="en-US" smtClean="0"/>
-              <a:t>2021-05-27</a:t>
+              <a:t>2021-07-03</a:t>
             </a:fld>
             <a:endParaRPr lang="ko-KR" altLang="en-US"/>
           </a:p>
@@ -6874,7 +6874,7 @@
           <a:p>
             <a:fld id="{3D067A03-45D1-4EAE-8DA0-F79B7BEE625A}" type="datetimeFigureOut">
               <a:rPr lang="ko-KR" altLang="en-US" smtClean="0"/>
-              <a:t>2021-05-27</a:t>
+              <a:t>2021-07-03</a:t>
             </a:fld>
             <a:endParaRPr lang="ko-KR" altLang="en-US"/>
           </a:p>
@@ -7541,7 +7541,7 @@
           <a:p>
             <a:fld id="{3D067A03-45D1-4EAE-8DA0-F79B7BEE625A}" type="datetimeFigureOut">
               <a:rPr lang="ko-KR" altLang="en-US" smtClean="0"/>
-              <a:t>2021-05-27</a:t>
+              <a:t>2021-07-03</a:t>
             </a:fld>
             <a:endParaRPr lang="ko-KR" altLang="en-US"/>
           </a:p>
@@ -8157,7 +8157,7 @@
           <a:p>
             <a:fld id="{3D067A03-45D1-4EAE-8DA0-F79B7BEE625A}" type="datetimeFigureOut">
               <a:rPr lang="ko-KR" altLang="en-US" smtClean="0"/>
-              <a:t>2021-05-27</a:t>
+              <a:t>2021-07-03</a:t>
             </a:fld>
             <a:endParaRPr lang="ko-KR" altLang="en-US"/>
           </a:p>
@@ -11195,49 +11195,50 @@
           <a:bodyPr/>
           <a:lstStyle/>
           <a:p>
-            <a:r>
-              <a:rPr lang="ko-KR" altLang="en-US" dirty="0"/>
-              <a:t>옷의 지퍼처럼 두 그룹의 데이터를 서로 엮어주는 함수</a:t>
-            </a:r>
-            <a:endParaRPr lang="en-US" altLang="ko-KR" dirty="0"/>
-          </a:p>
-          <a:p>
-            <a:r>
-              <a:rPr lang="ko-KR" altLang="en-US" dirty="0"/>
-              <a:t>여러 개의 순환가능한</a:t>
-            </a:r>
-            <a:r>
-              <a:rPr lang="en-US" altLang="ko-KR" dirty="0"/>
-              <a:t>(</a:t>
-            </a:r>
-            <a:r>
-              <a:rPr lang="en-US" altLang="ko-KR" dirty="0" err="1"/>
-              <a:t>iterable</a:t>
-            </a:r>
-            <a:r>
-              <a:rPr lang="en-US" altLang="ko-KR" dirty="0"/>
-              <a:t>)</a:t>
-            </a:r>
-            <a:r>
-              <a:rPr lang="ko-KR" altLang="en-US" dirty="0"/>
-              <a:t>객체를 인자로 받고</a:t>
-            </a:r>
-            <a:r>
-              <a:rPr lang="en-US" altLang="ko-KR" dirty="0"/>
-              <a:t>, </a:t>
-            </a:r>
-            <a:r>
-              <a:rPr lang="ko-KR" altLang="en-US" dirty="0"/>
-              <a:t>각 객체가 담고 있는 원소를 </a:t>
-            </a:r>
-            <a:r>
-              <a:rPr lang="ko-KR" altLang="en-US" dirty="0" err="1"/>
-              <a:t>튜플의</a:t>
-            </a:r>
-            <a:r>
-              <a:rPr lang="ko-KR" altLang="en-US" dirty="0"/>
-              <a:t> 형태로 반환</a:t>
-            </a:r>
+            <a:pPr marL="0" indent="0">
+              <a:buNone/>
+            </a:pPr>
+            <a:r>
+              <a:rPr lang="ko-KR" altLang="en-US" dirty="0" smtClean="0"/>
+              <a:t>출력</a:t>
+            </a:r>
+            <a:r>
+              <a:rPr lang="en-US" altLang="ko-KR" dirty="0" smtClean="0"/>
+              <a:t>:</a:t>
+            </a:r>
+            <a:endParaRPr lang="en-US" altLang="ko-KR" dirty="0" smtClean="0"/>
+          </a:p>
+          <a:p>
+            <a:pPr marL="0" indent="0">
+              <a:buNone/>
+            </a:pPr>
+            <a:r>
+              <a:rPr lang="en-US" altLang="ko-KR" dirty="0" smtClean="0"/>
+              <a:t>(1, ’A’)</a:t>
+            </a:r>
+          </a:p>
+          <a:p>
+            <a:pPr marL="0" indent="0">
+              <a:buNone/>
+            </a:pPr>
+            <a:r>
+              <a:rPr lang="en-US" altLang="ko-KR" dirty="0" smtClean="0"/>
+              <a:t>(2, ’B’)</a:t>
+            </a:r>
+          </a:p>
+          <a:p>
+            <a:pPr marL="0" indent="0">
+              <a:buNone/>
+            </a:pPr>
+            <a:r>
+              <a:rPr lang="en-US" altLang="ko-KR" dirty="0" smtClean="0"/>
+              <a:t>(3, ’C</a:t>
+            </a:r>
+            <a:r>
+              <a:rPr lang="en-US" altLang="ko-KR" dirty="0" smtClean="0"/>
+              <a:t>’)</a:t>
+            </a:r>
+            <a:endParaRPr lang="en-US" altLang="ko-KR" dirty="0" smtClean="0"/>
           </a:p>
         </p:txBody>
       </p:sp>
@@ -11665,12 +11666,16 @@
           <a:lstStyle/>
           <a:p>
             <a:r>
+              <a:rPr lang="ko-KR" altLang="en-US" dirty="0" err="1"/>
+              <a:t>실습문제</a:t>
+            </a:r>
+            <a:r>
               <a:rPr lang="ko-KR" altLang="en-US" dirty="0"/>
-              <a:t>실습문제 </a:t>
+              <a:t> </a:t>
             </a:r>
             <a:r>
               <a:rPr lang="en-US" altLang="ko-KR" dirty="0"/>
-              <a:t>1</a:t>
+              <a:t>5</a:t>
             </a:r>
             <a:endParaRPr lang="ko-KR" altLang="en-US" dirty="0"/>
           </a:p>
@@ -11888,12 +11893,16 @@
           <a:lstStyle/>
           <a:p>
             <a:r>
+              <a:rPr lang="ko-KR" altLang="en-US" dirty="0" err="1"/>
+              <a:t>실습문제</a:t>
+            </a:r>
+            <a:r>
               <a:rPr lang="ko-KR" altLang="en-US" dirty="0"/>
-              <a:t>실습문제 </a:t>
+              <a:t> </a:t>
             </a:r>
             <a:r>
               <a:rPr lang="en-US" altLang="ko-KR" dirty="0"/>
-              <a:t>2</a:t>
+              <a:t>6</a:t>
             </a:r>
             <a:endParaRPr lang="ko-KR" altLang="en-US" dirty="0"/>
           </a:p>
@@ -12169,12 +12178,16 @@
           <a:lstStyle/>
           <a:p>
             <a:r>
+              <a:rPr lang="ko-KR" altLang="en-US" dirty="0" err="1"/>
+              <a:t>실습문제</a:t>
+            </a:r>
+            <a:r>
               <a:rPr lang="ko-KR" altLang="en-US" dirty="0"/>
-              <a:t>실습문제 </a:t>
+              <a:t> </a:t>
             </a:r>
             <a:r>
               <a:rPr lang="en-US" altLang="ko-KR" dirty="0"/>
-              <a:t>3</a:t>
+              <a:t>7</a:t>
             </a:r>
             <a:endParaRPr lang="ko-KR" altLang="en-US" dirty="0"/>
           </a:p>
@@ -12204,41 +12217,13 @@
         </p:spPr>
         <p:txBody>
           <a:bodyPr>
-            <a:normAutofit/>
+            <a:normAutofit fontScale="55000" lnSpcReduction="20000"/>
           </a:bodyPr>
           <a:lstStyle/>
           <a:p>
             <a:pPr marL="0" indent="0">
               <a:buNone/>
             </a:pPr>
-            <a:r>
-              <a:rPr lang="ko-KR" altLang="en-US" sz="2500" dirty="0"/>
-              <a:t>저장된 패스워드는 </a:t>
-            </a:r>
-            <a:r>
-              <a:rPr lang="en-US" altLang="ko-KR" sz="2500" dirty="0"/>
-              <a:t>4593</a:t>
-            </a:r>
-            <a:r>
-              <a:rPr lang="ko-KR" altLang="en-US" sz="2500" dirty="0"/>
-              <a:t>이다</a:t>
-            </a:r>
-            <a:r>
-              <a:rPr lang="en-US" altLang="ko-KR" sz="2500" dirty="0"/>
-              <a:t>. </a:t>
-            </a:r>
-            <a:r>
-              <a:rPr lang="ko-KR" altLang="en-US" sz="2500" dirty="0"/>
-              <a:t>사용자가 패스워드를 잘못 입력하면 계속해서 패스워드를 입력 받고</a:t>
-            </a:r>
-            <a:r>
-              <a:rPr lang="en-US" altLang="ko-KR" sz="2500" dirty="0"/>
-              <a:t>,</a:t>
-            </a:r>
-            <a:r>
-              <a:rPr lang="ko-KR" altLang="en-US" sz="2500" dirty="0"/>
-              <a:t> 정확한 패스워드를 </a:t>
-            </a:r>
             <a:endParaRPr lang="en-US" altLang="ko-KR" sz="2500" dirty="0"/>
           </a:p>
           <a:p>
@@ -12246,18 +12231,37 @@
               <a:buNone/>
             </a:pPr>
             <a:r>
-              <a:rPr lang="ko-KR" altLang="en-US" sz="2500" dirty="0"/>
-              <a:t>입력하면 환영합니다</a:t>
-            </a:r>
-            <a:r>
-              <a:rPr lang="en-US" altLang="ko-KR" sz="2500" dirty="0"/>
-              <a:t>!</a:t>
-            </a:r>
-            <a:r>
-              <a:rPr lang="ko-KR" altLang="en-US" sz="2500" dirty="0"/>
-              <a:t>를 출력하는 프로그램을 작성하라</a:t>
-            </a:r>
-            <a:endParaRPr lang="en-US" altLang="ko-KR" sz="2500" dirty="0"/>
+              <a:rPr lang="ko-KR" altLang="en-US" sz="4500" dirty="0"/>
+              <a:t>높이를 입력하면 높이만큼 별을 </a:t>
+            </a:r>
+            <a:endParaRPr lang="en-US" altLang="ko-KR" sz="4500" dirty="0"/>
+          </a:p>
+          <a:p>
+            <a:pPr marL="0" indent="0">
+              <a:buNone/>
+            </a:pPr>
+            <a:r>
+              <a:rPr lang="ko-KR" altLang="en-US" sz="4500" dirty="0"/>
+              <a:t>찍는 프로그램을 작성하라</a:t>
+            </a:r>
+            <a:endParaRPr lang="en-US" altLang="ko-KR" sz="4500" dirty="0"/>
+          </a:p>
+          <a:p>
+            <a:pPr marL="0" indent="0">
+              <a:buNone/>
+            </a:pPr>
+            <a:r>
+              <a:rPr lang="en-US" altLang="ko-KR" sz="4500" dirty="0"/>
+              <a:t>(‘^’</a:t>
+            </a:r>
+            <a:r>
+              <a:rPr lang="ko-KR" altLang="en-US" sz="4500" dirty="0"/>
+              <a:t>사용금지</a:t>
+            </a:r>
+            <a:r>
+              <a:rPr lang="en-US" altLang="ko-KR" sz="4500" dirty="0"/>
+              <a:t>)</a:t>
+            </a:r>
           </a:p>
         </p:txBody>
       </p:sp>
@@ -12286,7 +12290,7 @@
         </p:spPr>
         <p:txBody>
           <a:bodyPr>
-            <a:normAutofit/>
+            <a:normAutofit fontScale="55000" lnSpcReduction="20000"/>
           </a:bodyPr>
           <a:lstStyle/>
           <a:p>
@@ -12294,11 +12298,11 @@
               <a:buNone/>
             </a:pPr>
             <a:r>
-              <a:rPr lang="ko-KR" altLang="en-US" sz="2200" dirty="0"/>
+              <a:rPr lang="ko-KR" altLang="en-US" sz="4000" dirty="0"/>
               <a:t>출력</a:t>
             </a:r>
             <a:r>
-              <a:rPr lang="en-US" altLang="ko-KR" sz="2200" dirty="0"/>
+              <a:rPr lang="en-US" altLang="ko-KR" sz="4000" dirty="0"/>
               <a:t>:</a:t>
             </a:r>
           </a:p>
@@ -12306,44 +12310,34 @@
             <a:pPr marL="0" indent="0" algn="just">
               <a:buNone/>
             </a:pPr>
-            <a:r>
-              <a:rPr lang="ko-KR" altLang="en-US" sz="2200" dirty="0"/>
-              <a:t>비밀번호</a:t>
-            </a:r>
-            <a:r>
-              <a:rPr lang="en-US" altLang="ko-KR" sz="2200" dirty="0"/>
-              <a:t>:</a:t>
-            </a:r>
+            <a:endParaRPr lang="en-US" altLang="ko-KR" sz="4000" dirty="0"/>
           </a:p>
           <a:p>
             <a:pPr marL="0" indent="0" algn="just">
               <a:buNone/>
             </a:pPr>
             <a:r>
-              <a:rPr lang="en-US" altLang="ko-KR" sz="2200" dirty="0"/>
-              <a:t>2459</a:t>
+              <a:rPr lang="ko-KR" altLang="en-US" sz="4000" dirty="0"/>
+              <a:t>높이</a:t>
+            </a:r>
+            <a:r>
+              <a:rPr lang="en-US" altLang="ko-KR" sz="4000" dirty="0"/>
+              <a:t>:5</a:t>
             </a:r>
           </a:p>
           <a:p>
             <a:pPr marL="0" indent="0" algn="just">
               <a:buNone/>
             </a:pPr>
-            <a:r>
-              <a:rPr lang="ko-KR" altLang="en-US" sz="2200" dirty="0"/>
-              <a:t>비밀번호</a:t>
-            </a:r>
-            <a:r>
-              <a:rPr lang="en-US" altLang="ko-KR" sz="2200" dirty="0"/>
-              <a:t>:</a:t>
-            </a:r>
+            <a:endParaRPr lang="en-US" altLang="ko-KR" sz="4000" dirty="0"/>
           </a:p>
           <a:p>
             <a:pPr marL="0" indent="0" algn="just">
               <a:buNone/>
             </a:pPr>
             <a:r>
-              <a:rPr lang="en-US" altLang="ko-KR" sz="2200" dirty="0"/>
-              <a:t>4593</a:t>
+              <a:rPr lang="en-US" altLang="ko-KR" sz="4000" dirty="0"/>
+              <a:t>    *</a:t>
             </a:r>
           </a:p>
           <a:p>
@@ -12351,20 +12345,70 @@
               <a:buNone/>
             </a:pPr>
             <a:r>
-              <a:rPr lang="ko-KR" altLang="en-US" sz="2200" dirty="0"/>
-              <a:t>환영합니다</a:t>
-            </a:r>
-            <a:r>
-              <a:rPr lang="en-US" altLang="ko-KR" sz="2200" dirty="0"/>
-              <a:t>!</a:t>
-            </a:r>
+              <a:rPr lang="en-US" altLang="ko-KR" sz="4000" dirty="0"/>
+              <a:t>   ***</a:t>
+            </a:r>
+          </a:p>
+          <a:p>
+            <a:pPr marL="0" indent="0" algn="just">
+              <a:buNone/>
+            </a:pPr>
+            <a:r>
+              <a:rPr lang="en-US" altLang="ko-KR" sz="4000" dirty="0"/>
+              <a:t>  *****</a:t>
+            </a:r>
+          </a:p>
+          <a:p>
+            <a:pPr marL="0" indent="0" algn="just">
+              <a:buNone/>
+            </a:pPr>
+            <a:r>
+              <a:rPr lang="en-US" altLang="ko-KR" sz="4000" dirty="0"/>
+              <a:t> *******</a:t>
+            </a:r>
+          </a:p>
+          <a:p>
+            <a:pPr marL="0" indent="0" algn="just">
+              <a:buNone/>
+            </a:pPr>
+            <a:r>
+              <a:rPr lang="en-US" altLang="ko-KR" sz="4000" dirty="0"/>
+              <a:t>*********</a:t>
+            </a:r>
+          </a:p>
+          <a:p>
+            <a:pPr marL="0" indent="0" algn="just">
+              <a:buNone/>
+            </a:pPr>
+            <a:endParaRPr lang="en-US" altLang="ko-KR" sz="4000" dirty="0"/>
+          </a:p>
+          <a:p>
+            <a:pPr marL="0" indent="0" algn="just">
+              <a:buNone/>
+            </a:pPr>
+            <a:endParaRPr lang="en-US" altLang="ko-KR" sz="4000" dirty="0"/>
+          </a:p>
+          <a:p>
+            <a:pPr marL="0" indent="0" algn="r">
+              <a:buNone/>
+            </a:pPr>
+            <a:r>
+              <a:rPr lang="en-US" altLang="ko-KR" sz="3500" dirty="0"/>
+              <a:t>Pr05_07.py</a:t>
+            </a:r>
+          </a:p>
+          <a:p>
+            <a:pPr marL="0" indent="0" algn="just">
+              <a:buNone/>
+            </a:pPr>
+            <a:endParaRPr lang="en-US" altLang="ko-KR" dirty="0"/>
           </a:p>
         </p:txBody>
       </p:sp>
     </p:spTree>
     <p:extLst>
       <p:ext uri="{BB962C8B-B14F-4D97-AF65-F5344CB8AC3E}">
-        <p14:creationId xmlns:p14="http://schemas.microsoft.com/office/powerpoint/2010/main" val="3419898893"/>
+        <p14:creationId xmlns:p14="http://schemas.microsoft.com/office/powerpoint/2010/main" val="2761781308"/>
       </p:ext>
     </p:extLst>
   </p:cSld>
@@ -12413,12 +12457,16 @@
           <a:lstStyle/>
           <a:p>
             <a:r>
+              <a:rPr lang="ko-KR" altLang="en-US" dirty="0" err="1"/>
+              <a:t>실습문제</a:t>
+            </a:r>
+            <a:r>
               <a:rPr lang="ko-KR" altLang="en-US" dirty="0"/>
-              <a:t>실습문제 </a:t>
+              <a:t> </a:t>
             </a:r>
             <a:r>
               <a:rPr lang="en-US" altLang="ko-KR" dirty="0"/>
-              <a:t>4</a:t>
+              <a:t>8</a:t>
             </a:r>
             <a:endParaRPr lang="ko-KR" altLang="en-US" dirty="0"/>
           </a:p>
@@ -12448,13 +12496,41 @@
         </p:spPr>
         <p:txBody>
           <a:bodyPr>
-            <a:normAutofit fontScale="55000" lnSpcReduction="20000"/>
+            <a:normAutofit/>
           </a:bodyPr>
           <a:lstStyle/>
           <a:p>
             <a:pPr marL="0" indent="0">
               <a:buNone/>
             </a:pPr>
+            <a:r>
+              <a:rPr lang="ko-KR" altLang="en-US" sz="2500" dirty="0"/>
+              <a:t>저장된 패스워드는 </a:t>
+            </a:r>
+            <a:r>
+              <a:rPr lang="en-US" altLang="ko-KR" sz="2500" dirty="0"/>
+              <a:t>4593</a:t>
+            </a:r>
+            <a:r>
+              <a:rPr lang="ko-KR" altLang="en-US" sz="2500" dirty="0"/>
+              <a:t>이다</a:t>
+            </a:r>
+            <a:r>
+              <a:rPr lang="en-US" altLang="ko-KR" sz="2500" dirty="0"/>
+              <a:t>. </a:t>
+            </a:r>
+            <a:r>
+              <a:rPr lang="ko-KR" altLang="en-US" sz="2500" dirty="0"/>
+              <a:t>사용자가 패스워드를 잘못 입력하면 계속해서 패스워드를 입력 받고</a:t>
+            </a:r>
+            <a:r>
+              <a:rPr lang="en-US" altLang="ko-KR" sz="2500" dirty="0"/>
+              <a:t>,</a:t>
+            </a:r>
+            <a:r>
+              <a:rPr lang="ko-KR" altLang="en-US" sz="2500" dirty="0"/>
+              <a:t> 정확한 패스워드를 </a:t>
+            </a:r>
             <a:endParaRPr lang="en-US" altLang="ko-KR" sz="2500" dirty="0"/>
           </a:p>
           <a:p>
@@ -12462,37 +12538,18 @@
               <a:buNone/>
             </a:pPr>
             <a:r>
-              <a:rPr lang="ko-KR" altLang="en-US" sz="4500" dirty="0"/>
-              <a:t>높이를 입력하면 높이만큼 별을 </a:t>
-            </a:r>
-            <a:endParaRPr lang="en-US" altLang="ko-KR" sz="4500" dirty="0"/>
-          </a:p>
-          <a:p>
-            <a:pPr marL="0" indent="0">
-              <a:buNone/>
-            </a:pPr>
-            <a:r>
-              <a:rPr lang="ko-KR" altLang="en-US" sz="4500" dirty="0"/>
-              <a:t>찍는 프로그램을 작성하라</a:t>
-            </a:r>
-            <a:endParaRPr lang="en-US" altLang="ko-KR" sz="4500" dirty="0"/>
-          </a:p>
-          <a:p>
-            <a:pPr marL="0" indent="0">
-              <a:buNone/>
-            </a:pPr>
-            <a:r>
-              <a:rPr lang="en-US" altLang="ko-KR" sz="4500" dirty="0"/>
-              <a:t>(‘^’</a:t>
-            </a:r>
-            <a:r>
-              <a:rPr lang="ko-KR" altLang="en-US" sz="4500" dirty="0"/>
-              <a:t>사용금지</a:t>
-            </a:r>
-            <a:r>
-              <a:rPr lang="en-US" altLang="ko-KR" sz="4500" dirty="0"/>
-              <a:t>)</a:t>
-            </a:r>
+              <a:rPr lang="ko-KR" altLang="en-US" sz="2500" dirty="0"/>
+              <a:t>입력하면 환영합니다</a:t>
+            </a:r>
+            <a:r>
+              <a:rPr lang="en-US" altLang="ko-KR" sz="2500" dirty="0"/>
+              <a:t>!</a:t>
+            </a:r>
+            <a:r>
+              <a:rPr lang="ko-KR" altLang="en-US" sz="2500" dirty="0"/>
+              <a:t>를 출력하는 프로그램을 작성하라</a:t>
+            </a:r>
+            <a:endParaRPr lang="en-US" altLang="ko-KR" sz="2500" dirty="0"/>
           </a:p>
         </p:txBody>
       </p:sp>
@@ -12521,7 +12578,7 @@
         </p:spPr>
         <p:txBody>
           <a:bodyPr>
-            <a:normAutofit fontScale="55000" lnSpcReduction="20000"/>
+            <a:normAutofit/>
           </a:bodyPr>
           <a:lstStyle/>
           <a:p>
@@ -12529,11 +12586,11 @@
               <a:buNone/>
             </a:pPr>
             <a:r>
-              <a:rPr lang="ko-KR" altLang="en-US" sz="4000" dirty="0"/>
+              <a:rPr lang="ko-KR" altLang="en-US" sz="2200" dirty="0"/>
               <a:t>출력</a:t>
             </a:r>
             <a:r>
-              <a:rPr lang="en-US" altLang="ko-KR" sz="4000" dirty="0"/>
+              <a:rPr lang="en-US" altLang="ko-KR" sz="2200" dirty="0"/>
               <a:t>:</a:t>
             </a:r>
           </a:p>
@@ -12541,34 +12598,44 @@
             <a:pPr marL="0" indent="0" algn="just">
               <a:buNone/>
             </a:pPr>
-            <a:endParaRPr lang="en-US" altLang="ko-KR" sz="4000" dirty="0"/>
+            <a:r>
+              <a:rPr lang="ko-KR" altLang="en-US" sz="2200" dirty="0"/>
+              <a:t>비밀번호</a:t>
+            </a:r>
+            <a:r>
+              <a:rPr lang="en-US" altLang="ko-KR" sz="2200" dirty="0"/>
+              <a:t>:</a:t>
+            </a:r>
           </a:p>
           <a:p>
             <a:pPr marL="0" indent="0" algn="just">
               <a:buNone/>
             </a:pPr>
             <a:r>
-              <a:rPr lang="ko-KR" altLang="en-US" sz="4000" dirty="0"/>
-              <a:t>높이</a:t>
-            </a:r>
-            <a:r>
-              <a:rPr lang="en-US" altLang="ko-KR" sz="4000" dirty="0"/>
-              <a:t>:5</a:t>
+              <a:rPr lang="en-US" altLang="ko-KR" sz="2200" dirty="0"/>
+              <a:t>2459</a:t>
             </a:r>
           </a:p>
           <a:p>
             <a:pPr marL="0" indent="0" algn="just">
               <a:buNone/>
             </a:pPr>
-            <a:endParaRPr lang="en-US" altLang="ko-KR" sz="4000" dirty="0"/>
+            <a:r>
+              <a:rPr lang="ko-KR" altLang="en-US" sz="2200" dirty="0"/>
+              <a:t>비밀번호</a:t>
+            </a:r>
+            <a:r>
+              <a:rPr lang="en-US" altLang="ko-KR" sz="2200" dirty="0"/>
+              <a:t>:</a:t>
+            </a:r>
           </a:p>
           <a:p>
             <a:pPr marL="0" indent="0" algn="just">
               <a:buNone/>
             </a:pPr>
             <a:r>
-              <a:rPr lang="en-US" altLang="ko-KR" sz="4000" dirty="0"/>
-              <a:t>    *</a:t>
+              <a:rPr lang="en-US" altLang="ko-KR" sz="2200" dirty="0"/>
+              <a:t>4593</a:t>
             </a:r>
           </a:p>
           <a:p>
@@ -12576,70 +12643,20 @@
               <a:buNone/>
             </a:pPr>
             <a:r>
-              <a:rPr lang="en-US" altLang="ko-KR" sz="4000" dirty="0"/>
-              <a:t>   ***</a:t>
-            </a:r>
-          </a:p>
-          <a:p>
-            <a:pPr marL="0" indent="0" algn="just">
-              <a:buNone/>
-            </a:pPr>
-            <a:r>
-              <a:rPr lang="en-US" altLang="ko-KR" sz="4000" dirty="0"/>
-              <a:t>  *****</a:t>
-            </a:r>
-          </a:p>
-          <a:p>
-            <a:pPr marL="0" indent="0" algn="just">
-              <a:buNone/>
-            </a:pPr>
-            <a:r>
-              <a:rPr lang="en-US" altLang="ko-KR" sz="4000" dirty="0"/>
-              <a:t> *******</a:t>
-            </a:r>
-          </a:p>
-          <a:p>
-            <a:pPr marL="0" indent="0" algn="just">
-              <a:buNone/>
-            </a:pPr>
-            <a:r>
-              <a:rPr lang="en-US" altLang="ko-KR" sz="4000" dirty="0"/>
-              <a:t>*********</a:t>
-            </a:r>
-          </a:p>
-          <a:p>
-            <a:pPr marL="0" indent="0" algn="just">
-              <a:buNone/>
-            </a:pPr>
-            <a:endParaRPr lang="en-US" altLang="ko-KR" sz="4000" dirty="0"/>
-          </a:p>
-          <a:p>
-            <a:pPr marL="0" indent="0" algn="just">
-              <a:buNone/>
-            </a:pPr>
-            <a:endParaRPr lang="en-US" altLang="ko-KR" sz="4000" dirty="0"/>
-          </a:p>
-          <a:p>
-            <a:pPr marL="0" indent="0" algn="r">
-              <a:buNone/>
-            </a:pPr>
-            <a:r>
-              <a:rPr lang="en-US" altLang="ko-KR" sz="3500" dirty="0"/>
-              <a:t>Pr05_07.py</a:t>
-            </a:r>
-          </a:p>
-          <a:p>
-            <a:pPr marL="0" indent="0" algn="just">
-              <a:buNone/>
-            </a:pPr>
-            <a:endParaRPr lang="en-US" altLang="ko-KR" dirty="0"/>
+              <a:rPr lang="ko-KR" altLang="en-US" sz="2200" dirty="0"/>
+              <a:t>환영합니다</a:t>
+            </a:r>
+            <a:r>
+              <a:rPr lang="en-US" altLang="ko-KR" sz="2200" dirty="0"/>
+              <a:t>!</a:t>
+            </a:r>
           </a:p>
         </p:txBody>
       </p:sp>
     </p:spTree>
     <p:extLst>
       <p:ext uri="{BB962C8B-B14F-4D97-AF65-F5344CB8AC3E}">
-        <p14:creationId xmlns:p14="http://schemas.microsoft.com/office/powerpoint/2010/main" val="2761781308"/>
+        <p14:creationId xmlns:p14="http://schemas.microsoft.com/office/powerpoint/2010/main" val="3419898893"/>
       </p:ext>
     </p:extLst>
   </p:cSld>
@@ -12728,12 +12745,18 @@
           <a:lstStyle/>
           <a:p>
             <a:pPr marL="0" indent="0">
+              <a:lnSpc>
+                <a:spcPct val="100000"/>
+              </a:lnSpc>
               <a:buNone/>
             </a:pPr>
             <a:endParaRPr lang="en-US" altLang="ko-KR" sz="2500" dirty="0"/>
           </a:p>
           <a:p>
             <a:pPr marL="0" indent="0">
+              <a:lnSpc>
+                <a:spcPct val="100000"/>
+              </a:lnSpc>
               <a:buNone/>
             </a:pPr>
             <a:r>
@@ -12746,11 +12769,45 @@
             </a:r>
             <a:r>
               <a:rPr lang="ko-KR" altLang="en-US" dirty="0"/>
-              <a:t>을 입력하면 그 숫자가 소수인지 아닌지 판명하는 프로그램을 </a:t>
-            </a:r>
-            <a:r>
-              <a:rPr lang="ko-KR" altLang="en-US" dirty="0" err="1"/>
-              <a:t>작성하시오</a:t>
+              <a:t>을 </a:t>
+            </a:r>
+            <a:r>
+              <a:rPr lang="ko-KR" altLang="en-US" dirty="0" smtClean="0"/>
+              <a:t>입력하면</a:t>
+            </a:r>
+            <a:r>
+              <a:rPr lang="en-US" altLang="ko-KR" dirty="0" smtClean="0"/>
+              <a:t/>
+            </a:r>
+            <a:br>
+              <a:rPr lang="en-US" altLang="ko-KR" dirty="0" smtClean="0"/>
+            </a:br>
+            <a:r>
+              <a:rPr lang="ko-KR" altLang="en-US" dirty="0" smtClean="0"/>
+              <a:t>그 </a:t>
+            </a:r>
+            <a:r>
+              <a:rPr lang="ko-KR" altLang="en-US" dirty="0"/>
+              <a:t>숫자가 소수인지 </a:t>
+            </a:r>
+            <a:r>
+              <a:rPr lang="ko-KR" altLang="en-US" dirty="0" smtClean="0"/>
+              <a:t>아닌지</a:t>
+            </a:r>
+            <a:r>
+              <a:rPr lang="en-US" altLang="ko-KR" dirty="0" smtClean="0"/>
+              <a:t/>
+            </a:r>
+            <a:br>
+              <a:rPr lang="en-US" altLang="ko-KR" dirty="0" smtClean="0"/>
+            </a:br>
+            <a:r>
+              <a:rPr lang="ko-KR" altLang="en-US" dirty="0" smtClean="0"/>
+              <a:t>판명하는 </a:t>
+            </a:r>
+            <a:r>
+              <a:rPr lang="ko-KR" altLang="en-US" dirty="0"/>
+              <a:t>프로그램을 작성하시오</a:t>
             </a:r>
             <a:endParaRPr lang="en-US" altLang="ko-KR" dirty="0"/>
           </a:p>
@@ -12964,12 +13021,18 @@
           <a:lstStyle/>
           <a:p>
             <a:pPr marL="0" indent="0">
+              <a:lnSpc>
+                <a:spcPct val="110000"/>
+              </a:lnSpc>
               <a:buNone/>
             </a:pPr>
             <a:endParaRPr lang="en-US" altLang="ko-KR" sz="2500" dirty="0"/>
           </a:p>
           <a:p>
             <a:pPr marL="0" indent="0">
+              <a:lnSpc>
+                <a:spcPct val="110000"/>
+              </a:lnSpc>
               <a:buNone/>
             </a:pPr>
             <a:r>
@@ -12982,15 +13045,26 @@
             </a:r>
             <a:r>
               <a:rPr lang="ko-KR" altLang="en-US" dirty="0"/>
-              <a:t>선승 가위바위보 프로그램을 </a:t>
-            </a:r>
-            <a:r>
-              <a:rPr lang="ko-KR" altLang="en-US" dirty="0" err="1"/>
-              <a:t>작성하시오</a:t>
+              <a:t>선승 </a:t>
+            </a:r>
+            <a:r>
+              <a:rPr lang="ko-KR" altLang="en-US" dirty="0" smtClean="0"/>
+              <a:t>가위바위보</a:t>
+            </a:r>
+            <a:r>
+              <a:rPr lang="en-US" altLang="ko-KR" dirty="0" smtClean="0"/>
+              <a:t/>
+            </a:r>
+            <a:br>
+              <a:rPr lang="en-US" altLang="ko-KR" dirty="0" smtClean="0"/>
+            </a:br>
+            <a:r>
+              <a:rPr lang="ko-KR" altLang="en-US" dirty="0" smtClean="0"/>
+              <a:t>프로그램을 </a:t>
             </a:r>
             <a:r>
               <a:rPr lang="ko-KR" altLang="en-US" dirty="0"/>
-              <a:t> </a:t>
+              <a:t>작성하시오 </a:t>
             </a:r>
             <a:endParaRPr lang="en-US" altLang="ko-KR" dirty="0"/>
           </a:p>
@@ -13285,16 +13359,13 @@
           <a:lstStyle/>
           <a:p>
             <a:pPr marL="0" indent="0">
-              <a:buNone/>
-            </a:pPr>
-            <a:endParaRPr lang="en-US" altLang="ko-KR" sz="2500" dirty="0"/>
-          </a:p>
-          <a:p>
-            <a:pPr marL="0" indent="0">
-              <a:buNone/>
-            </a:pPr>
-            <a:r>
-              <a:rPr lang="ko-KR" altLang="en-US" sz="2200" dirty="0"/>
+              <a:lnSpc>
+                <a:spcPct val="100000"/>
+              </a:lnSpc>
+              <a:buNone/>
+            </a:pPr>
+            <a:r>
+              <a:rPr lang="ko-KR" altLang="en-US" sz="2200" dirty="0" smtClean="0"/>
               <a:t>모듈이란</a:t>
             </a:r>
             <a:r>
@@ -13303,6 +13374,11 @@
             </a:r>
           </a:p>
           <a:p>
+            <a:pPr>
+              <a:lnSpc>
+                <a:spcPct val="100000"/>
+              </a:lnSpc>
+            </a:pPr>
             <a:r>
               <a:rPr lang="ko-KR" altLang="en-US" sz="2200" dirty="0"/>
               <a:t>함수나 변수 또는 클래스를 모아 놓은 파일</a:t>
@@ -13310,6 +13386,11 @@
             <a:endParaRPr lang="en-US" altLang="ko-KR" sz="2200" dirty="0"/>
           </a:p>
           <a:p>
+            <a:pPr>
+              <a:lnSpc>
+                <a:spcPct val="100000"/>
+              </a:lnSpc>
+            </a:pPr>
             <a:r>
               <a:rPr lang="ko-KR" altLang="en-US" sz="2200" dirty="0"/>
               <a:t>다른 파이썬 프로그램에서 불러와 사용할 수 있게끔 만든 파이썬 파일</a:t>
@@ -13317,6 +13398,11 @@
             <a:endParaRPr lang="en-US" altLang="ko-KR" sz="2200" dirty="0"/>
           </a:p>
           <a:p>
+            <a:pPr>
+              <a:lnSpc>
+                <a:spcPct val="100000"/>
+              </a:lnSpc>
+            </a:pPr>
             <a:r>
               <a:rPr lang="en-US" altLang="ko-KR" sz="2200" dirty="0"/>
               <a:t>Import &lt;</a:t>
@@ -13336,6 +13422,11 @@
             <a:endParaRPr lang="en-US" altLang="ko-KR" sz="2200" dirty="0"/>
           </a:p>
           <a:p>
+            <a:pPr>
+              <a:lnSpc>
+                <a:spcPct val="100000"/>
+              </a:lnSpc>
+            </a:pPr>
             <a:r>
               <a:rPr lang="en-US" altLang="ko-KR" sz="2200" dirty="0"/>
               <a:t>&lt;</a:t>
@@ -13485,11 +13576,14 @@
         </p:spPr>
         <p:txBody>
           <a:bodyPr>
-            <a:normAutofit fontScale="92500" lnSpcReduction="10000"/>
+            <a:normAutofit fontScale="85000" lnSpcReduction="20000"/>
           </a:bodyPr>
           <a:lstStyle/>
           <a:p>
             <a:pPr marL="0" indent="0">
+              <a:lnSpc>
+                <a:spcPct val="110000"/>
+              </a:lnSpc>
               <a:buNone/>
             </a:pPr>
             <a:r>
@@ -13512,27 +13606,48 @@
           </a:p>
           <a:p>
             <a:pPr marL="0" indent="0">
-              <a:buNone/>
-            </a:pPr>
+              <a:lnSpc>
+                <a:spcPct val="110000"/>
+              </a:lnSpc>
+              <a:buNone/>
+            </a:pPr>
+            <a:r>
+              <a:rPr lang="ko-KR" altLang="en-US" sz="2500" dirty="0" smtClean="0"/>
+              <a:t>프로그램은</a:t>
+            </a:r>
+            <a:r>
+              <a:rPr lang="en-US" altLang="ko-KR" sz="2500" dirty="0" smtClean="0"/>
+              <a:t/>
+            </a:r>
+            <a:br>
+              <a:rPr lang="en-US" altLang="ko-KR" sz="2500" dirty="0" smtClean="0"/>
+            </a:br>
+            <a:r>
+              <a:rPr lang="en-US" altLang="ko-KR" sz="2500" dirty="0" smtClean="0"/>
+              <a:t>1. </a:t>
+            </a:r>
+            <a:r>
+              <a:rPr lang="ko-KR" altLang="en-US" sz="2500" smtClean="0"/>
+              <a:t>학생 조회 </a:t>
+            </a:r>
+            <a:r>
+              <a:rPr lang="en-US" altLang="ko-KR" sz="2500" dirty="0" smtClean="0"/>
+              <a:t/>
+            </a:r>
+            <a:br>
+              <a:rPr lang="en-US" altLang="ko-KR" sz="2500" dirty="0" smtClean="0"/>
+            </a:br>
+            <a:r>
+              <a:rPr lang="en-US" altLang="ko-KR" sz="2500" dirty="0" smtClean="0"/>
+              <a:t>2. </a:t>
+            </a:r>
+            <a:r>
+              <a:rPr lang="ko-KR" altLang="en-US" sz="2500" dirty="0" smtClean="0"/>
+              <a:t>학생 </a:t>
+            </a:r>
             <a:r>
               <a:rPr lang="ko-KR" altLang="en-US" sz="2500" dirty="0"/>
-              <a:t>프로그램은 </a:t>
-            </a:r>
-            <a:r>
-              <a:rPr lang="en-US" altLang="ko-KR" sz="2500" dirty="0"/>
-              <a:t>1.</a:t>
-            </a:r>
-            <a:r>
-              <a:rPr lang="ko-KR" altLang="en-US" sz="2500" dirty="0"/>
-              <a:t>학생조회 </a:t>
-            </a:r>
-            <a:r>
-              <a:rPr lang="en-US" altLang="ko-KR" sz="2500" dirty="0"/>
-              <a:t>2.</a:t>
-            </a:r>
-            <a:r>
-              <a:rPr lang="ko-KR" altLang="en-US" sz="2500" dirty="0"/>
-              <a:t>학생 정보</a:t>
+              <a:t>정보</a:t>
             </a:r>
             <a:r>
               <a:rPr lang="en-US" altLang="ko-KR" sz="2500" dirty="0"/>
@@ -13564,27 +13679,60 @@
             </a:r>
             <a:r>
               <a:rPr lang="ko-KR" altLang="en-US" sz="2500" dirty="0"/>
-              <a:t> 입력</a:t>
-            </a:r>
-            <a:r>
-              <a:rPr lang="en-US" altLang="ko-KR" sz="2500" dirty="0"/>
-              <a:t>, 3. </a:t>
+              <a:t> </a:t>
+            </a:r>
+            <a:r>
+              <a:rPr lang="ko-KR" altLang="en-US" sz="2500" dirty="0" smtClean="0"/>
+              <a:t>입력</a:t>
+            </a:r>
+            <a:r>
+              <a:rPr lang="en-US" altLang="ko-KR" sz="2500" dirty="0" smtClean="0"/>
+              <a:t/>
+            </a:r>
+            <a:br>
+              <a:rPr lang="en-US" altLang="ko-KR" sz="2500" dirty="0" smtClean="0"/>
+            </a:br>
+            <a:r>
+              <a:rPr lang="en-US" altLang="ko-KR" sz="2500" dirty="0" smtClean="0"/>
+              <a:t>3</a:t>
+            </a:r>
+            <a:r>
+              <a:rPr lang="en-US" altLang="ko-KR" sz="2500" dirty="0" smtClean="0"/>
+              <a:t>. </a:t>
             </a:r>
             <a:r>
               <a:rPr lang="ko-KR" altLang="en-US" sz="2500" dirty="0"/>
               <a:t>학생 정보 변경 </a:t>
             </a:r>
             <a:r>
+              <a:rPr lang="en-US" altLang="ko-KR" sz="2500" dirty="0" smtClean="0"/>
+              <a:t/>
+            </a:r>
+            <a:br>
+              <a:rPr lang="en-US" altLang="ko-KR" sz="2500" dirty="0" smtClean="0"/>
+            </a:br>
+            <a:r>
+              <a:rPr lang="en-US" altLang="ko-KR" sz="2500" dirty="0" smtClean="0"/>
+              <a:t>4. </a:t>
+            </a:r>
+            <a:r>
+              <a:rPr lang="ko-KR" altLang="en-US" sz="2500" dirty="0" smtClean="0"/>
+              <a:t>학생 삭제</a:t>
+            </a:r>
+            <a:r>
               <a:rPr lang="en-US" altLang="ko-KR" sz="2500" dirty="0"/>
-              <a:t>4.</a:t>
-            </a:r>
-            <a:r>
-              <a:rPr lang="ko-KR" altLang="en-US" sz="2500" dirty="0"/>
-              <a:t>학생 삭제</a:t>
-            </a:r>
-            <a:r>
+              <a:t/>
+            </a:r>
+            <a:br>
               <a:rPr lang="en-US" altLang="ko-KR" sz="2500" dirty="0"/>
-              <a:t>, 5. </a:t>
+            </a:br>
+            <a:r>
+              <a:rPr lang="en-US" altLang="ko-KR" sz="2500" dirty="0" smtClean="0"/>
+              <a:t>5</a:t>
+            </a:r>
+            <a:r>
+              <a:rPr lang="en-US" altLang="ko-KR" sz="2500" dirty="0"/>
+              <a:t>. </a:t>
             </a:r>
             <a:r>
               <a:rPr lang="ko-KR" altLang="en-US" sz="2500" dirty="0"/>
@@ -13622,11 +13770,14 @@
         </p:spPr>
         <p:txBody>
           <a:bodyPr>
-            <a:normAutofit fontScale="92500" lnSpcReduction="10000"/>
+            <a:normAutofit fontScale="85000" lnSpcReduction="20000"/>
           </a:bodyPr>
           <a:lstStyle/>
           <a:p>
             <a:pPr marL="0" indent="0">
+              <a:lnSpc>
+                <a:spcPct val="110000"/>
+              </a:lnSpc>
               <a:buNone/>
             </a:pPr>
             <a:r>
@@ -13649,6 +13800,9 @@
           </a:p>
           <a:p>
             <a:pPr marL="0" indent="0">
+              <a:lnSpc>
+                <a:spcPct val="110000"/>
+              </a:lnSpc>
               <a:buNone/>
             </a:pPr>
             <a:r>
@@ -13719,6 +13873,9 @@
           </a:p>
           <a:p>
             <a:pPr marL="0" indent="0">
+              <a:lnSpc>
+                <a:spcPct val="110000"/>
+              </a:lnSpc>
               <a:buNone/>
             </a:pPr>
             <a:r>
@@ -13733,6 +13890,9 @@
           </a:p>
           <a:p>
             <a:pPr marL="0" indent="0">
+              <a:lnSpc>
+                <a:spcPct val="110000"/>
+              </a:lnSpc>
               <a:buNone/>
             </a:pPr>
             <a:r>
@@ -13755,6 +13915,9 @@
           </a:p>
           <a:p>
             <a:pPr marL="0" indent="0">
+              <a:lnSpc>
+                <a:spcPct val="110000"/>
+              </a:lnSpc>
               <a:buNone/>
             </a:pPr>
             <a:r>
@@ -13765,24 +13928,36 @@
           </a:p>
           <a:p>
             <a:pPr marL="0" indent="0">
+              <a:lnSpc>
+                <a:spcPct val="110000"/>
+              </a:lnSpc>
               <a:buNone/>
             </a:pPr>
             <a:endParaRPr lang="en-US" altLang="ko-KR" sz="2200" dirty="0"/>
           </a:p>
           <a:p>
             <a:pPr marL="0" indent="0" algn="r">
+              <a:lnSpc>
+                <a:spcPct val="110000"/>
+              </a:lnSpc>
               <a:buNone/>
             </a:pPr>
             <a:endParaRPr lang="en-US" altLang="ko-KR" sz="2200" dirty="0"/>
           </a:p>
           <a:p>
             <a:pPr marL="0" indent="0" algn="r">
+              <a:lnSpc>
+                <a:spcPct val="110000"/>
+              </a:lnSpc>
               <a:buNone/>
             </a:pPr>
             <a:endParaRPr lang="en-US" altLang="ko-KR" sz="2200" dirty="0"/>
           </a:p>
           <a:p>
             <a:pPr marL="0" indent="0" algn="r">
+              <a:lnSpc>
+                <a:spcPct val="110000"/>
+              </a:lnSpc>
               <a:buNone/>
             </a:pPr>
             <a:r>
@@ -16028,6 +16203,12 @@
 </file>
 
 <file path=customXml/item1.xml><?xml version="1.0" encoding="utf-8"?>
+<p:properties xmlns:p="http://schemas.microsoft.com/office/2006/metadata/properties" xmlns:xsi="http://www.w3.org/2001/XMLSchema-instance" xmlns:pc="http://schemas.microsoft.com/office/infopath/2007/PartnerControls">
+  <documentManagement/>
+</p:properties>
+</file>
+
+<file path=customXml/item2.xml><?xml version="1.0" encoding="utf-8"?>
 <ct:contentTypeSchema xmlns:ct="http://schemas.microsoft.com/office/2006/metadata/contentType" xmlns:ma="http://schemas.microsoft.com/office/2006/metadata/properties/metaAttributes" ct:_="" ma:_="" ma:contentTypeName="문서" ma:contentTypeID="0x010100724BE246D5096A49A61468620B4F694C" ma:contentTypeVersion="2" ma:contentTypeDescription="새 문서를 만듭니다." ma:contentTypeScope="" ma:versionID="ffc1fd754d50385c74eaa0c429a23f87">
   <xsd:schema xmlns:xsd="http://www.w3.org/2001/XMLSchema" xmlns:xs="http://www.w3.org/2001/XMLSchema" xmlns:p="http://schemas.microsoft.com/office/2006/metadata/properties" xmlns:ns3="0e4de794-19e7-4a03-8a25-6601fbe4a2ad" targetNamespace="http://schemas.microsoft.com/office/2006/metadata/properties" ma:root="true" ma:fieldsID="37d4eeb6abfbeb3504662c7bbcc66b17" ns3:_="">
     <xsd:import namespace="0e4de794-19e7-4a03-8a25-6601fbe4a2ad"/>
@@ -16159,12 +16340,6 @@
 </ct:contentTypeSchema>
 </file>
 
-<file path=customXml/item2.xml><?xml version="1.0" encoding="utf-8"?>
-<p:properties xmlns:p="http://schemas.microsoft.com/office/2006/metadata/properties" xmlns:xsi="http://www.w3.org/2001/XMLSchema-instance" xmlns:pc="http://schemas.microsoft.com/office/infopath/2007/PartnerControls">
-  <documentManagement/>
-</p:properties>
-</file>
-
 <file path=customXml/item3.xml><?xml version="1.0" encoding="utf-8"?>
 <?mso-contentType ?>
 <FormTemplates xmlns="http://schemas.microsoft.com/sharepoint/v3/contenttype/forms">
@@ -16175,6 +16350,22 @@
 </file>
 
 <file path=customXml/itemProps1.xml><?xml version="1.0" encoding="utf-8"?>
+<ds:datastoreItem xmlns:ds="http://schemas.openxmlformats.org/officeDocument/2006/customXml" ds:itemID="{78B8425E-138E-4BE1-A1A1-DEAF16F7CC80}">
+  <ds:schemaRefs>
+    <ds:schemaRef ds:uri="http://purl.org/dc/terms/"/>
+    <ds:schemaRef ds:uri="http://schemas.openxmlformats.org/package/2006/metadata/core-properties"/>
+    <ds:schemaRef ds:uri="http://purl.org/dc/dcmitype/"/>
+    <ds:schemaRef ds:uri="http://schemas.microsoft.com/office/infopath/2007/PartnerControls"/>
+    <ds:schemaRef ds:uri="0e4de794-19e7-4a03-8a25-6601fbe4a2ad"/>
+    <ds:schemaRef ds:uri="http://purl.org/dc/elements/1.1/"/>
+    <ds:schemaRef ds:uri="http://schemas.microsoft.com/office/2006/metadata/properties"/>
+    <ds:schemaRef ds:uri="http://schemas.microsoft.com/office/2006/documentManagement/types"/>
+    <ds:schemaRef ds:uri="http://www.w3.org/XML/1998/namespace"/>
+  </ds:schemaRefs>
+</ds:datastoreItem>
+</file>
+
+<file path=customXml/itemProps2.xml><?xml version="1.0" encoding="utf-8"?>
 <ds:datastoreItem xmlns:ds="http://schemas.openxmlformats.org/officeDocument/2006/customXml" ds:itemID="{08C9C6FB-1032-40F6-99A4-A36D9F16D83B}">
   <ds:schemaRefs>
     <ds:schemaRef ds:uri="http://schemas.microsoft.com/office/2006/metadata/contentType"/>
@@ -16192,22 +16383,6 @@
 </ds:datastoreItem>
 </file>
 
-<file path=customXml/itemProps2.xml><?xml version="1.0" encoding="utf-8"?>
-<ds:datastoreItem xmlns:ds="http://schemas.openxmlformats.org/officeDocument/2006/customXml" ds:itemID="{78B8425E-138E-4BE1-A1A1-DEAF16F7CC80}">
-  <ds:schemaRefs>
-    <ds:schemaRef ds:uri="http://purl.org/dc/terms/"/>
-    <ds:schemaRef ds:uri="http://schemas.openxmlformats.org/package/2006/metadata/core-properties"/>
-    <ds:schemaRef ds:uri="http://purl.org/dc/dcmitype/"/>
-    <ds:schemaRef ds:uri="http://schemas.microsoft.com/office/infopath/2007/PartnerControls"/>
-    <ds:schemaRef ds:uri="0e4de794-19e7-4a03-8a25-6601fbe4a2ad"/>
-    <ds:schemaRef ds:uri="http://purl.org/dc/elements/1.1/"/>
-    <ds:schemaRef ds:uri="http://schemas.microsoft.com/office/2006/metadata/properties"/>
-    <ds:schemaRef ds:uri="http://schemas.microsoft.com/office/2006/documentManagement/types"/>
-    <ds:schemaRef ds:uri="http://www.w3.org/XML/1998/namespace"/>
-  </ds:schemaRefs>
-</ds:datastoreItem>
-</file>
-
 <file path=customXml/itemProps3.xml><?xml version="1.0" encoding="utf-8"?>
 <ds:datastoreItem xmlns:ds="http://schemas.openxmlformats.org/officeDocument/2006/customXml" ds:itemID="{B94506D1-FFA9-47EE-B148-AFA604BEB1B8}">
   <ds:schemaRefs>

</xml_diff>